<commit_message>
added ppt for afternoon session
</commit_message>
<xml_diff>
--- a/WesternRegionalWorkshop/BreakoutSession.pptx
+++ b/WesternRegionalWorkshop/BreakoutSession.pptx
@@ -5,7 +5,7 @@
     <p:sldMasterId id="2147483648" r:id="rId1"/>
   </p:sldMasterIdLst>
   <p:notesMasterIdLst>
-    <p:notesMasterId r:id="rId15"/>
+    <p:notesMasterId r:id="rId16"/>
   </p:notesMasterIdLst>
   <p:sldIdLst>
     <p:sldId id="256" r:id="rId2"/>
@@ -20,7 +20,8 @@
     <p:sldId id="267" r:id="rId11"/>
     <p:sldId id="269" r:id="rId12"/>
     <p:sldId id="268" r:id="rId13"/>
-    <p:sldId id="270" r:id="rId14"/>
+    <p:sldId id="271" r:id="rId14"/>
+    <p:sldId id="270" r:id="rId15"/>
   </p:sldIdLst>
   <p:sldSz cx="9144000" cy="6858000" type="screen4x3"/>
   <p:notesSz cx="6858000" cy="9144000"/>
@@ -204,7 +205,7 @@
           <a:p>
             <a:fld id="{844F1466-6C0E-46F7-A1FD-F468262409E9}" type="datetimeFigureOut">
               <a:rPr lang="en-US" smtClean="0"/>
-              <a:t>5/10/2013</a:t>
+              <a:t>5/12/2013</a:t>
             </a:fld>
             <a:endParaRPr lang="en-US"/>
           </a:p>
@@ -829,7 +830,7 @@
           <a:p>
             <a:fld id="{6F32646D-919B-4210-A35D-AB1862CBE9CC}" type="datetimeFigureOut">
               <a:rPr lang="en-US" smtClean="0"/>
-              <a:t>5/10/2013</a:t>
+              <a:t>5/12/2013</a:t>
             </a:fld>
             <a:endParaRPr lang="en-US"/>
           </a:p>
@@ -999,7 +1000,7 @@
           <a:p>
             <a:fld id="{6F32646D-919B-4210-A35D-AB1862CBE9CC}" type="datetimeFigureOut">
               <a:rPr lang="en-US" smtClean="0"/>
-              <a:t>5/10/2013</a:t>
+              <a:t>5/12/2013</a:t>
             </a:fld>
             <a:endParaRPr lang="en-US"/>
           </a:p>
@@ -1179,7 +1180,7 @@
           <a:p>
             <a:fld id="{6F32646D-919B-4210-A35D-AB1862CBE9CC}" type="datetimeFigureOut">
               <a:rPr lang="en-US" smtClean="0"/>
-              <a:t>5/10/2013</a:t>
+              <a:t>5/12/2013</a:t>
             </a:fld>
             <a:endParaRPr lang="en-US"/>
           </a:p>
@@ -1349,7 +1350,7 @@
           <a:p>
             <a:fld id="{6F32646D-919B-4210-A35D-AB1862CBE9CC}" type="datetimeFigureOut">
               <a:rPr lang="en-US" smtClean="0"/>
-              <a:t>5/10/2013</a:t>
+              <a:t>5/12/2013</a:t>
             </a:fld>
             <a:endParaRPr lang="en-US"/>
           </a:p>
@@ -1595,7 +1596,7 @@
           <a:p>
             <a:fld id="{6F32646D-919B-4210-A35D-AB1862CBE9CC}" type="datetimeFigureOut">
               <a:rPr lang="en-US" smtClean="0"/>
-              <a:t>5/10/2013</a:t>
+              <a:t>5/12/2013</a:t>
             </a:fld>
             <a:endParaRPr lang="en-US"/>
           </a:p>
@@ -1883,7 +1884,7 @@
           <a:p>
             <a:fld id="{6F32646D-919B-4210-A35D-AB1862CBE9CC}" type="datetimeFigureOut">
               <a:rPr lang="en-US" smtClean="0"/>
-              <a:t>5/10/2013</a:t>
+              <a:t>5/12/2013</a:t>
             </a:fld>
             <a:endParaRPr lang="en-US"/>
           </a:p>
@@ -2305,7 +2306,7 @@
           <a:p>
             <a:fld id="{6F32646D-919B-4210-A35D-AB1862CBE9CC}" type="datetimeFigureOut">
               <a:rPr lang="en-US" smtClean="0"/>
-              <a:t>5/10/2013</a:t>
+              <a:t>5/12/2013</a:t>
             </a:fld>
             <a:endParaRPr lang="en-US"/>
           </a:p>
@@ -2423,7 +2424,7 @@
           <a:p>
             <a:fld id="{6F32646D-919B-4210-A35D-AB1862CBE9CC}" type="datetimeFigureOut">
               <a:rPr lang="en-US" smtClean="0"/>
-              <a:t>5/10/2013</a:t>
+              <a:t>5/12/2013</a:t>
             </a:fld>
             <a:endParaRPr lang="en-US"/>
           </a:p>
@@ -2518,7 +2519,7 @@
           <a:p>
             <a:fld id="{6F32646D-919B-4210-A35D-AB1862CBE9CC}" type="datetimeFigureOut">
               <a:rPr lang="en-US" smtClean="0"/>
-              <a:t>5/10/2013</a:t>
+              <a:t>5/12/2013</a:t>
             </a:fld>
             <a:endParaRPr lang="en-US"/>
           </a:p>
@@ -2795,7 +2796,7 @@
           <a:p>
             <a:fld id="{6F32646D-919B-4210-A35D-AB1862CBE9CC}" type="datetimeFigureOut">
               <a:rPr lang="en-US" smtClean="0"/>
-              <a:t>5/10/2013</a:t>
+              <a:t>5/12/2013</a:t>
             </a:fld>
             <a:endParaRPr lang="en-US"/>
           </a:p>
@@ -3048,7 +3049,7 @@
           <a:p>
             <a:fld id="{6F32646D-919B-4210-A35D-AB1862CBE9CC}" type="datetimeFigureOut">
               <a:rPr lang="en-US" smtClean="0"/>
-              <a:t>5/10/2013</a:t>
+              <a:t>5/12/2013</a:t>
             </a:fld>
             <a:endParaRPr lang="en-US"/>
           </a:p>
@@ -3287,7 +3288,7 @@
           <a:p>
             <a:fld id="{6F32646D-919B-4210-A35D-AB1862CBE9CC}" type="datetimeFigureOut">
               <a:rPr lang="en-US" smtClean="0"/>
-              <a:t>5/10/2013</a:t>
+              <a:t>5/12/2013</a:t>
             </a:fld>
             <a:endParaRPr lang="en-US"/>
           </a:p>
@@ -4288,22 +4289,30 @@
           <a:p>
             <a:pPr lvl="1"/>
             <a:r>
+              <a:rPr lang="en-US" sz="2400"/>
+              <a:t>adhere to data types (text or number) specifications</a:t>
+            </a:r>
+          </a:p>
+          <a:p>
+            <a:pPr lvl="1"/>
+            <a:r>
+              <a:rPr lang="en-US" sz="2400" smtClean="0"/>
+              <a:t>all </a:t>
+            </a:r>
+            <a:r>
               <a:rPr lang="en-US" sz="2400" dirty="0" smtClean="0"/>
-              <a:t>all required fields having data</a:t>
+              <a:t>required fields having data</a:t>
             </a:r>
           </a:p>
           <a:p>
             <a:pPr lvl="1"/>
             <a:r>
+              <a:rPr lang="en-US" sz="2400" smtClean="0"/>
+              <a:t>adhere </a:t>
+            </a:r>
+            <a:r>
               <a:rPr lang="en-US" sz="2400" dirty="0" smtClean="0"/>
-              <a:t>adhere to data types (text or number) specifications</a:t>
-            </a:r>
-          </a:p>
-          <a:p>
-            <a:pPr lvl="1"/>
-            <a:r>
-              <a:rPr lang="en-US" sz="2400" dirty="0" smtClean="0"/>
-              <a:t>adhere to the fields as listed in the workbook and schema</a:t>
+              <a:t>to the fields as listed in the workbook and schema</a:t>
             </a:r>
             <a:endParaRPr lang="en-US" sz="2400" dirty="0"/>
           </a:p>
@@ -4329,6 +4338,179 @@
 </file>
 
 <file path=ppt/slides/slide13.xml><?xml version="1.0" encoding="utf-8"?>
+<p:sld xmlns:a="http://schemas.openxmlformats.org/drawingml/2006/main" xmlns:r="http://schemas.openxmlformats.org/officeDocument/2006/relationships" xmlns:p="http://schemas.openxmlformats.org/presentationml/2006/main">
+  <p:cSld>
+    <p:spTree>
+      <p:nvGrpSpPr>
+        <p:cNvPr id="1" name=""/>
+        <p:cNvGrpSpPr/>
+        <p:nvPr/>
+      </p:nvGrpSpPr>
+      <p:grpSpPr>
+        <a:xfrm>
+          <a:off x="0" y="0"/>
+          <a:ext cx="0" cy="0"/>
+          <a:chOff x="0" y="0"/>
+          <a:chExt cx="0" cy="0"/>
+        </a:xfrm>
+      </p:grpSpPr>
+      <p:sp>
+        <p:nvSpPr>
+          <p:cNvPr id="3" name="Content Placeholder 2"/>
+          <p:cNvSpPr>
+            <a:spLocks noGrp="1"/>
+          </p:cNvSpPr>
+          <p:nvPr>
+            <p:ph idx="1"/>
+          </p:nvPr>
+        </p:nvSpPr>
+        <p:spPr/>
+        <p:txBody>
+          <a:bodyPr>
+            <a:normAutofit/>
+          </a:bodyPr>
+          <a:lstStyle/>
+          <a:p>
+            <a:r>
+              <a:rPr lang="en-US" sz="2400"/>
+              <a:t>adhere to data types (text or number</a:t>
+            </a:r>
+            <a:r>
+              <a:rPr lang="en-US" sz="2400"/>
+              <a:t>) </a:t>
+            </a:r>
+            <a:r>
+              <a:rPr lang="en-US" sz="2400" smtClean="0"/>
+              <a:t>specifications</a:t>
+            </a:r>
+          </a:p>
+          <a:p>
+            <a:pPr lvl="1"/>
+            <a:r>
+              <a:rPr lang="en-US" sz="2000" smtClean="0"/>
+              <a:t>date format = yyyy-mm-dd:T\hh</a:t>
+            </a:r>
+            <a:endParaRPr lang="en-US" sz="2000"/>
+          </a:p>
+          <a:p>
+            <a:r>
+              <a:rPr lang="en-US" sz="2400" smtClean="0"/>
+              <a:t>all </a:t>
+            </a:r>
+            <a:r>
+              <a:rPr lang="en-US" sz="2400"/>
+              <a:t>required fields having </a:t>
+            </a:r>
+            <a:r>
+              <a:rPr lang="en-US" sz="2400" smtClean="0"/>
+              <a:t>data; If missing:</a:t>
+            </a:r>
+          </a:p>
+          <a:p>
+            <a:pPr lvl="1" fontAlgn="base"/>
+            <a:r>
+              <a:rPr lang="en-US" sz="2000"/>
+              <a:t>string = Missing</a:t>
+            </a:r>
+          </a:p>
+          <a:p>
+            <a:pPr lvl="1" fontAlgn="base"/>
+            <a:r>
+              <a:rPr lang="en-US" sz="2000"/>
+              <a:t>date =  1/1/1900T00:00</a:t>
+            </a:r>
+          </a:p>
+          <a:p>
+            <a:pPr lvl="1" fontAlgn="base"/>
+            <a:r>
+              <a:rPr lang="en-US" sz="2000"/>
+              <a:t>double = -999 </a:t>
+            </a:r>
+          </a:p>
+          <a:p>
+            <a:r>
+              <a:rPr lang="en-US" sz="2400" smtClean="0"/>
+              <a:t>adhere </a:t>
+            </a:r>
+            <a:r>
+              <a:rPr lang="en-US" sz="2400"/>
+              <a:t>to the fields as listed in the workbook and </a:t>
+            </a:r>
+            <a:r>
+              <a:rPr lang="en-US" sz="2400" smtClean="0"/>
+              <a:t>schema</a:t>
+            </a:r>
+          </a:p>
+          <a:p>
+            <a:pPr lvl="0"/>
+            <a:r>
+              <a:rPr lang="en-US" sz="2400" smtClean="0"/>
+              <a:t>check </a:t>
+            </a:r>
+            <a:r>
+              <a:rPr lang="en-US" sz="2400"/>
+              <a:t>for </a:t>
+            </a:r>
+            <a:r>
+              <a:rPr lang="en-US" sz="2400" smtClean="0"/>
+              <a:t>reasonable data </a:t>
+            </a:r>
+            <a:endParaRPr lang="en-US" sz="2400"/>
+          </a:p>
+          <a:p>
+            <a:pPr lvl="0"/>
+            <a:r>
+              <a:rPr lang="en-US" sz="2400" smtClean="0"/>
+              <a:t>create meaningful labels </a:t>
+            </a:r>
+            <a:endParaRPr lang="en-US" sz="2400"/>
+          </a:p>
+          <a:p>
+            <a:endParaRPr lang="en-US"/>
+          </a:p>
+          <a:p>
+            <a:endParaRPr lang="en-US"/>
+          </a:p>
+        </p:txBody>
+      </p:sp>
+      <p:sp>
+        <p:nvSpPr>
+          <p:cNvPr id="4" name="Title 1"/>
+          <p:cNvSpPr>
+            <a:spLocks noGrp="1"/>
+          </p:cNvSpPr>
+          <p:nvPr>
+            <p:ph type="title"/>
+          </p:nvPr>
+        </p:nvSpPr>
+        <p:spPr/>
+        <p:txBody>
+          <a:bodyPr/>
+          <a:lstStyle/>
+          <a:p>
+            <a:pPr algn="l"/>
+            <a:r>
+              <a:rPr lang="en-US" dirty="0" smtClean="0"/>
+              <a:t>“Good” Data</a:t>
+            </a:r>
+            <a:endParaRPr lang="en-US" dirty="0"/>
+          </a:p>
+        </p:txBody>
+      </p:sp>
+    </p:spTree>
+    <p:extLst>
+      <p:ext uri="{BB962C8B-B14F-4D97-AF65-F5344CB8AC3E}">
+        <p14:creationId xmlns:p14="http://schemas.microsoft.com/office/powerpoint/2010/main" val="147993872"/>
+      </p:ext>
+    </p:extLst>
+  </p:cSld>
+  <p:clrMapOvr>
+    <a:masterClrMapping/>
+  </p:clrMapOvr>
+</p:sld>
+</file>
+
+<file path=ppt/slides/slide14.xml><?xml version="1.0" encoding="utf-8"?>
 <p:sld xmlns:a="http://schemas.openxmlformats.org/drawingml/2006/main" xmlns:r="http://schemas.openxmlformats.org/officeDocument/2006/relationships" xmlns:p="http://schemas.openxmlformats.org/presentationml/2006/main">
   <p:cSld>
     <p:spTree>
@@ -5388,15 +5570,7 @@
             </a:r>
             <a:r>
               <a:rPr lang="en-US" sz="2500" dirty="0" smtClean="0"/>
-              <a:t>includes a content 	model (Excel workbook) which provides a “template” to 	make </a:t>
-            </a:r>
-            <a:r>
-              <a:rPr lang="en-US" sz="2500" dirty="0" smtClean="0"/>
-              <a:t>it easier </a:t>
-            </a:r>
-            <a:r>
-              <a:rPr lang="en-US" sz="2500" dirty="0" smtClean="0"/>
-              <a:t>for researchers to submit their data with 	structure (allowing for interoperability as specified by a 	schema)</a:t>
+              <a:t>includes a content 	model (Excel workbook) which provides a “template” to 	make it easier for researchers to submit their data with 	structure (allowing for interoperability as specified by a 	schema)</a:t>
             </a:r>
           </a:p>
           <a:p>
@@ -5913,11 +6087,7 @@
             </a:r>
             <a:r>
               <a:rPr lang="en-US" sz="2400" dirty="0" smtClean="0"/>
-              <a:t>of </a:t>
-            </a:r>
-            <a:r>
-              <a:rPr lang="en-US" sz="2400" dirty="0" smtClean="0"/>
-              <a:t>personal or file </a:t>
+              <a:t>of personal or file </a:t>
             </a:r>
             <a:r>
               <a:rPr lang="en-US" sz="2400" dirty="0" err="1" smtClean="0"/>
@@ -5925,15 +6095,7 @@
             </a:r>
             <a:r>
               <a:rPr lang="en-US" sz="2400" dirty="0" smtClean="0"/>
-              <a:t> </a:t>
-            </a:r>
-            <a:r>
-              <a:rPr lang="en-US" sz="2400" dirty="0" smtClean="0"/>
-              <a:t>to </a:t>
-            </a:r>
-            <a:r>
-              <a:rPr lang="en-US" sz="2400" dirty="0" smtClean="0"/>
-              <a:t>Excel ‘Template’ tab, concatenate data in fields, consolidate more easily</a:t>
+              <a:t> to Excel ‘Template’ tab, concatenate data in fields, consolidate more easily</a:t>
             </a:r>
           </a:p>
           <a:p>

</xml_diff>